<commit_message>
fix: mudança no layout do pptx
</commit_message>
<xml_diff>
--- a/template/Questoes_Desafio.pptx
+++ b/template/Questoes_Desafio.pptx
@@ -262,7 +262,7 @@
       </p15:sldGuideLst>
     </p:ext>
     <p:ext uri="GoogleSlidesCustomDataVersion2">
-      <go:slidesCustomData xmlns:go="http://customooxmlschemas.google.com/" xmlns:ahyp="http://schemas.microsoft.com/office/drawing/2018/hyperlinkcolor" xmlns:p15="http://schemas.microsoft.com/office/powerpoint/2012/main" xmlns:p14="http://schemas.microsoft.com/office/powerpoint/2010/main" xmlns:com="http://schemas.openxmlformats.org/drawingml/2006/compatibility" xmlns:pvml="urn:schemas-microsoft-com:office:powerpoint" xmlns:v="urn:schemas-microsoft-com:vml" xmlns:o="urn:schemas-microsoft-com:office:office" xmlns:dgm="http://schemas.openxmlformats.org/drawingml/2006/diagram" xmlns:c="http://schemas.openxmlformats.org/drawingml/2006/chart" xmlns:mv="urn:schemas-microsoft-com:mac:vml" xmlns:mc="http://schemas.openxmlformats.org/markup-compatibility/2006" xmlns="" r:id="rId27" roundtripDataSignature="AMtx7mgi/y+fcqq1kn38//Ml9KTNeFtUDQ=="/>
+      <go:slidesCustomData xmlns="" xmlns:mc="http://schemas.openxmlformats.org/markup-compatibility/2006" xmlns:mv="urn:schemas-microsoft-com:mac:vml" xmlns:c="http://schemas.openxmlformats.org/drawingml/2006/chart" xmlns:dgm="http://schemas.openxmlformats.org/drawingml/2006/diagram" xmlns:o="urn:schemas-microsoft-com:office:office" xmlns:v="urn:schemas-microsoft-com:vml" xmlns:pvml="urn:schemas-microsoft-com:office:powerpoint" xmlns:com="http://schemas.openxmlformats.org/drawingml/2006/compatibility" xmlns:p14="http://schemas.microsoft.com/office/powerpoint/2010/main" xmlns:p15="http://schemas.microsoft.com/office/powerpoint/2012/main" xmlns:ahyp="http://schemas.microsoft.com/office/drawing/2018/hyperlinkcolor" xmlns:go="http://customooxmlschemas.google.com/" r:id="rId27" roundtripDataSignature="AMtx7mgi/y+fcqq1kn38//Ml9KTNeFtUDQ=="/>
     </p:ext>
   </p:extLst>
 </p:presentation>
@@ -14497,7 +14497,7 @@
                 <a:ea typeface="Verdana"/>
                 <a:cs typeface="Verdana"/>
               </a:rPr>
-              <a:t>QUESTÃO XXX</a:t>
+              <a:t>id</a:t>
             </a:r>
           </a:p>
         </p:txBody>
@@ -14533,309 +14533,31 @@
           </a:bodyPr>
           <a:lstStyle/>
           <a:p>
-            <a:pPr marL="0" lvl="0" indent="0" algn="just" rtl="0">
-              <a:spcBef>
-                <a:spcPts val="1200"/>
-              </a:spcBef>
-              <a:spcAft>
-                <a:spcPts val="0"/>
-              </a:spcAft>
-              <a:buClr>
-                <a:schemeClr val="dk1"/>
-              </a:buClr>
-              <a:buSzPts val="1100"/>
+            <a:pPr marL="0" marR="0" lvl="0" indent="0" algn="just" rtl="0">
+              <a:lnSpc>
+                <a:spcPct val="100000"/>
+              </a:lnSpc>
+              <a:spcBef>
+                <a:spcPts val="0"/>
+              </a:spcBef>
+              <a:spcAft>
+                <a:spcPts val="0"/>
+              </a:spcAft>
+              <a:buClr>
+                <a:srgbClr val="000000"/>
+              </a:buClr>
+              <a:buSzPts val="1600"/>
               <a:buFont typeface="Arial"/>
               <a:buNone/>
             </a:pPr>
             <a:r>
-              <a:rPr lang="pt-BR" sz="1000" b="1" dirty="0">
-                <a:solidFill>
-                  <a:srgbClr val="666666"/>
-                </a:solidFill>
-                <a:highlight>
-                  <a:srgbClr val="FFFFFF"/>
-                </a:highlight>
-                <a:latin typeface="Verdana"/>
-                <a:ea typeface="Verdana"/>
-                <a:cs typeface="Verdana"/>
-                <a:sym typeface="Verdana"/>
+              <a:rPr lang="pt-BR" sz="1000" dirty="0" err="1">
+                <a:solidFill>
+                  <a:schemeClr val="dk1"/>
+                </a:solidFill>
               </a:rPr>
-              <a:t>Nível:</a:t>
+              <a:t>questao</a:t>
             </a:r>
-            <a:r>
-              <a:rPr lang="pt-BR" sz="1000" dirty="0">
-                <a:solidFill>
-                  <a:srgbClr val="666666"/>
-                </a:solidFill>
-                <a:highlight>
-                  <a:srgbClr val="FFFFFF"/>
-                </a:highlight>
-                <a:latin typeface="Verdana"/>
-                <a:ea typeface="Verdana"/>
-                <a:cs typeface="Verdana"/>
-                <a:sym typeface="Verdana"/>
-              </a:rPr>
-              <a:t> Média</a:t>
-            </a:r>
-            <a:endParaRPr sz="1000" dirty="0">
-              <a:solidFill>
-                <a:srgbClr val="666666"/>
-              </a:solidFill>
-              <a:highlight>
-                <a:srgbClr val="FFFFFF"/>
-              </a:highlight>
-              <a:latin typeface="Verdana"/>
-              <a:ea typeface="Verdana"/>
-              <a:cs typeface="Verdana"/>
-              <a:sym typeface="Verdana"/>
-            </a:endParaRPr>
-          </a:p>
-          <a:p>
-            <a:pPr marL="0" lvl="0" indent="0" algn="just" rtl="0">
-              <a:spcBef>
-                <a:spcPts val="1200"/>
-              </a:spcBef>
-              <a:spcAft>
-                <a:spcPts val="0"/>
-              </a:spcAft>
-              <a:buClr>
-                <a:schemeClr val="dk1"/>
-              </a:buClr>
-              <a:buSzPts val="1100"/>
-              <a:buFont typeface="Arial"/>
-              <a:buNone/>
-            </a:pPr>
-            <a:r>
-              <a:rPr lang="pt-BR" sz="1000" b="1" dirty="0">
-                <a:solidFill>
-                  <a:srgbClr val="666666"/>
-                </a:solidFill>
-                <a:highlight>
-                  <a:srgbClr val="FFFFFF"/>
-                </a:highlight>
-                <a:latin typeface="Verdana"/>
-                <a:ea typeface="Verdana"/>
-                <a:cs typeface="Verdana"/>
-                <a:sym typeface="Verdana"/>
-              </a:rPr>
-              <a:t>Competência: </a:t>
-            </a:r>
-            <a:r>
-              <a:rPr lang="pt-BR" sz="1000" dirty="0">
-                <a:solidFill>
-                  <a:srgbClr val="666666"/>
-                </a:solidFill>
-                <a:highlight>
-                  <a:srgbClr val="FFFFFF"/>
-                </a:highlight>
-                <a:latin typeface="Verdana"/>
-                <a:ea typeface="Verdana"/>
-                <a:cs typeface="Verdana"/>
-                <a:sym typeface="Verdana"/>
-              </a:rPr>
-              <a:t>Pensamento científico, crítico e criativo </a:t>
-            </a:r>
-            <a:endParaRPr sz="1000" dirty="0">
-              <a:solidFill>
-                <a:srgbClr val="666666"/>
-              </a:solidFill>
-              <a:highlight>
-                <a:srgbClr val="FFFFFF"/>
-              </a:highlight>
-              <a:latin typeface="Verdana"/>
-              <a:ea typeface="Verdana"/>
-              <a:cs typeface="Verdana"/>
-              <a:sym typeface="Verdana"/>
-            </a:endParaRPr>
-          </a:p>
-          <a:p>
-            <a:pPr marL="0" lvl="0" indent="0" algn="just" rtl="0">
-              <a:spcBef>
-                <a:spcPts val="1200"/>
-              </a:spcBef>
-              <a:spcAft>
-                <a:spcPts val="0"/>
-              </a:spcAft>
-              <a:buClr>
-                <a:schemeClr val="dk1"/>
-              </a:buClr>
-              <a:buSzPts val="1100"/>
-              <a:buFont typeface="Arial"/>
-              <a:buNone/>
-            </a:pPr>
-            <a:endParaRPr sz="1000" dirty="0">
-              <a:solidFill>
-                <a:srgbClr val="666666"/>
-              </a:solidFill>
-              <a:highlight>
-                <a:srgbClr val="FFFFFF"/>
-              </a:highlight>
-              <a:latin typeface="Verdana"/>
-              <a:ea typeface="Verdana"/>
-              <a:cs typeface="Verdana"/>
-              <a:sym typeface="Verdana"/>
-            </a:endParaRPr>
-          </a:p>
-          <a:p>
-            <a:pPr marL="0" lvl="0" indent="0" algn="just" rtl="0">
-              <a:spcBef>
-                <a:spcPts val="1200"/>
-              </a:spcBef>
-              <a:spcAft>
-                <a:spcPts val="0"/>
-              </a:spcAft>
-              <a:buClr>
-                <a:schemeClr val="dk1"/>
-              </a:buClr>
-              <a:buSzPts val="1100"/>
-              <a:buFont typeface="Arial"/>
-              <a:buNone/>
-            </a:pPr>
-            <a:r>
-              <a:rPr lang="pt-BR" sz="1000" b="1" dirty="0">
-                <a:solidFill>
-                  <a:srgbClr val="666666"/>
-                </a:solidFill>
-                <a:highlight>
-                  <a:srgbClr val="FFFFFF"/>
-                </a:highlight>
-                <a:latin typeface="Verdana"/>
-                <a:ea typeface="Verdana"/>
-                <a:cs typeface="Verdana"/>
-                <a:sym typeface="Verdana"/>
-              </a:rPr>
-              <a:t>TEMA:</a:t>
-            </a:r>
-            <a:endParaRPr sz="1000" b="1" dirty="0">
-              <a:solidFill>
-                <a:srgbClr val="666666"/>
-              </a:solidFill>
-              <a:highlight>
-                <a:srgbClr val="FFFFFF"/>
-              </a:highlight>
-              <a:latin typeface="Verdana"/>
-              <a:ea typeface="Verdana"/>
-              <a:cs typeface="Verdana"/>
-              <a:sym typeface="Verdana"/>
-            </a:endParaRPr>
-          </a:p>
-          <a:p>
-            <a:pPr marL="0" lvl="0" indent="0" algn="just" rtl="0">
-              <a:spcBef>
-                <a:spcPts val="1200"/>
-              </a:spcBef>
-              <a:spcAft>
-                <a:spcPts val="0"/>
-              </a:spcAft>
-              <a:buClr>
-                <a:schemeClr val="dk1"/>
-              </a:buClr>
-              <a:buSzPts val="1100"/>
-              <a:buFont typeface="Arial"/>
-              <a:buNone/>
-            </a:pPr>
-            <a:endParaRPr sz="1000" b="1" dirty="0">
-              <a:solidFill>
-                <a:srgbClr val="666666"/>
-              </a:solidFill>
-              <a:highlight>
-                <a:srgbClr val="FFFFFF"/>
-              </a:highlight>
-              <a:latin typeface="Verdana"/>
-              <a:ea typeface="Verdana"/>
-              <a:cs typeface="Verdana"/>
-              <a:sym typeface="Verdana"/>
-            </a:endParaRPr>
-          </a:p>
-          <a:p>
-            <a:pPr marL="0" lvl="0" indent="0" algn="just" rtl="0">
-              <a:spcBef>
-                <a:spcPts val="1200"/>
-              </a:spcBef>
-              <a:spcAft>
-                <a:spcPts val="0"/>
-              </a:spcAft>
-              <a:buClr>
-                <a:schemeClr val="dk1"/>
-              </a:buClr>
-              <a:buSzPts val="1100"/>
-              <a:buFont typeface="Arial"/>
-              <a:buNone/>
-            </a:pPr>
-            <a:r>
-              <a:rPr lang="pt-BR" sz="1000" b="1" dirty="0">
-                <a:solidFill>
-                  <a:srgbClr val="666666"/>
-                </a:solidFill>
-                <a:highlight>
-                  <a:srgbClr val="FFFFFF"/>
-                </a:highlight>
-                <a:latin typeface="Verdana"/>
-                <a:ea typeface="Verdana"/>
-                <a:cs typeface="Verdana"/>
-                <a:sym typeface="Verdana"/>
-              </a:rPr>
-              <a:t>ANOTAÇÕES: </a:t>
-            </a:r>
-            <a:endParaRPr sz="1000" b="1" dirty="0">
-              <a:solidFill>
-                <a:srgbClr val="666666"/>
-              </a:solidFill>
-              <a:highlight>
-                <a:srgbClr val="FFFFFF"/>
-              </a:highlight>
-              <a:latin typeface="Verdana"/>
-              <a:ea typeface="Verdana"/>
-              <a:cs typeface="Verdana"/>
-              <a:sym typeface="Verdana"/>
-            </a:endParaRPr>
-          </a:p>
-          <a:p>
-            <a:pPr marL="0" lvl="0" indent="0" algn="l" rtl="0">
-              <a:lnSpc>
-                <a:spcPct val="85000"/>
-              </a:lnSpc>
-              <a:spcBef>
-                <a:spcPts val="400"/>
-              </a:spcBef>
-              <a:spcAft>
-                <a:spcPts val="0"/>
-              </a:spcAft>
-              <a:buClr>
-                <a:schemeClr val="dk1"/>
-              </a:buClr>
-              <a:buSzPts val="1100"/>
-              <a:buFont typeface="Arial"/>
-              <a:buNone/>
-            </a:pPr>
-            <a:endParaRPr sz="1000" b="1" dirty="0">
-              <a:solidFill>
-                <a:srgbClr val="660099"/>
-              </a:solidFill>
-              <a:latin typeface="Verdana"/>
-              <a:ea typeface="Verdana"/>
-              <a:cs typeface="Verdana"/>
-              <a:sym typeface="Verdana"/>
-            </a:endParaRPr>
-          </a:p>
-          <a:p>
-            <a:pPr marL="0" marR="0" lvl="0" indent="0" algn="just" rtl="0">
-              <a:lnSpc>
-                <a:spcPct val="100000"/>
-              </a:lnSpc>
-              <a:spcBef>
-                <a:spcPts val="0"/>
-              </a:spcBef>
-              <a:spcAft>
-                <a:spcPts val="0"/>
-              </a:spcAft>
-              <a:buClr>
-                <a:srgbClr val="000000"/>
-              </a:buClr>
-              <a:buSzPts val="1600"/>
-              <a:buFont typeface="Arial"/>
-              <a:buNone/>
-            </a:pPr>
             <a:endParaRPr sz="1000" dirty="0">
               <a:solidFill>
                 <a:schemeClr val="dk1"/>
@@ -14929,7 +14651,7 @@
                 <a:ea typeface="Verdana"/>
                 <a:cs typeface="Verdana"/>
               </a:rPr>
-              <a:t>XXXX</a:t>
+              <a:t>tipo</a:t>
             </a:r>
           </a:p>
         </p:txBody>
@@ -15019,7 +14741,7 @@
                 <a:ea typeface="Verdana"/>
                 <a:cs typeface="Verdana"/>
               </a:rPr>
-              <a:t>XXXX</a:t>
+              <a:t>area</a:t>
             </a:r>
           </a:p>
         </p:txBody>
@@ -15109,7 +14831,7 @@
                 <a:ea typeface="Verdana"/>
                 <a:cs typeface="Verdana"/>
               </a:rPr>
-              <a:t>XXXX</a:t>
+              <a:t>nivel</a:t>
             </a:r>
           </a:p>
         </p:txBody>
@@ -15125,7 +14847,7 @@
         <p:fade/>
       </p:transition>
     </mc:Choice>
-    <mc:Fallback xmlns:ahyp="http://schemas.microsoft.com/office/drawing/2018/hyperlinkcolor" xmlns:p15="http://schemas.microsoft.com/office/powerpoint/2012/main" xmlns:com="http://schemas.openxmlformats.org/drawingml/2006/compatibility" xmlns:pvml="urn:schemas-microsoft-com:office:powerpoint" xmlns:v="urn:schemas-microsoft-com:vml" xmlns:o="urn:schemas-microsoft-com:office:office" xmlns:dgm="http://schemas.openxmlformats.org/drawingml/2006/diagram" xmlns:c="http://schemas.openxmlformats.org/drawingml/2006/chart" xmlns:mv="urn:schemas-microsoft-com:mac:vml" xmlns="">
+    <mc:Fallback xmlns="" xmlns:mv="urn:schemas-microsoft-com:mac:vml" xmlns:c="http://schemas.openxmlformats.org/drawingml/2006/chart" xmlns:dgm="http://schemas.openxmlformats.org/drawingml/2006/diagram" xmlns:o="urn:schemas-microsoft-com:office:office" xmlns:v="urn:schemas-microsoft-com:vml" xmlns:pvml="urn:schemas-microsoft-com:office:powerpoint" xmlns:com="http://schemas.openxmlformats.org/drawingml/2006/compatibility" xmlns:p15="http://schemas.microsoft.com/office/powerpoint/2012/main" xmlns:ahyp="http://schemas.microsoft.com/office/drawing/2018/hyperlinkcolor">
       <p:transition spd="slow">
         <p:fade/>
       </p:transition>

</xml_diff>